<commit_message>
Made minor improvements to "14. Delegates and Events"
</commit_message>
<xml_diff>
--- a/Courses/Software-Sciences/Module-1-OOP-New/14-Delegates-and-Events/14-Delegates-and-Events.pptx
+++ b/Courses/Software-Sciences/Module-1-OOP-New/14-Delegates-and-Events/14-Delegates-and-Events.pptx
@@ -325,7 +325,7 @@
           <a:p>
             <a:fld id="{4E087215-0C8F-4762-A664-737A353EC9A4}" type="datetimeFigureOut">
               <a:rPr lang="bg-BG" smtClean="0"/>
-              <a:t>4.01.23 г.</a:t>
+              <a:t>13.01.23 г.</a:t>
             </a:fld>
             <a:endParaRPr lang="bg-BG"/>
           </a:p>
@@ -516,7 +516,7 @@
           <a:p>
             <a:fld id="{72D84649-876A-46C9-8472-14CB09C070D8}" type="datetimeFigureOut">
               <a:rPr lang="en-US" smtClean="0"/>
-              <a:t>1/4/23</a:t>
+              <a:t>1/13/23</a:t>
             </a:fld>
             <a:endParaRPr lang="en-US"/>
           </a:p>
@@ -938,6 +938,247 @@
 </p:notes>
 </file>
 
+<file path=ppt/notesSlides/notesSlide10.xml><?xml version="1.0" encoding="utf-8"?>
+<p:notes xmlns:a="http://schemas.openxmlformats.org/drawingml/2006/main" xmlns:r="http://schemas.openxmlformats.org/officeDocument/2006/relationships" xmlns:p="http://schemas.openxmlformats.org/presentationml/2006/main">
+  <p:cSld>
+    <p:spTree>
+      <p:nvGrpSpPr>
+        <p:cNvPr id="1" name=""/>
+        <p:cNvGrpSpPr/>
+        <p:nvPr/>
+      </p:nvGrpSpPr>
+      <p:grpSpPr>
+        <a:xfrm>
+          <a:off x="0" y="0"/>
+          <a:ext cx="0" cy="0"/>
+          <a:chOff x="0" y="0"/>
+          <a:chExt cx="0" cy="0"/>
+        </a:xfrm>
+      </p:grpSpPr>
+      <p:sp>
+        <p:nvSpPr>
+          <p:cNvPr id="2" name="Slide Image Placeholder 1"/>
+          <p:cNvSpPr>
+            <a:spLocks noGrp="1" noRot="1" noChangeAspect="1"/>
+          </p:cNvSpPr>
+          <p:nvPr>
+            <p:ph type="sldImg"/>
+          </p:nvPr>
+        </p:nvSpPr>
+        <p:spPr/>
+      </p:sp>
+      <p:sp>
+        <p:nvSpPr>
+          <p:cNvPr id="3" name="Notes Placeholder 2"/>
+          <p:cNvSpPr>
+            <a:spLocks noGrp="1"/>
+          </p:cNvSpPr>
+          <p:nvPr>
+            <p:ph type="body" idx="1"/>
+          </p:nvPr>
+        </p:nvSpPr>
+        <p:spPr/>
+        <p:txBody>
+          <a:bodyPr/>
+          <a:lstStyle/>
+          <a:p>
+            <a:endParaRPr lang="en-US"/>
+          </a:p>
+        </p:txBody>
+      </p:sp>
+      <p:sp>
+        <p:nvSpPr>
+          <p:cNvPr id="6" name="Slide Number Placeholder 5">
+            <a:extLst>
+              <a:ext uri="{FF2B5EF4-FFF2-40B4-BE49-F238E27FC236}">
+                <a16:creationId xmlns:a16="http://schemas.microsoft.com/office/drawing/2014/main" id="{6627548A-4D3C-449B-81A5-FA4BE4628490}"/>
+              </a:ext>
+            </a:extLst>
+          </p:cNvPr>
+          <p:cNvSpPr txBox="1">
+            <a:spLocks/>
+          </p:cNvSpPr>
+          <p:nvPr/>
+        </p:nvSpPr>
+        <p:spPr>
+          <a:xfrm>
+            <a:off x="6488999" y="8847000"/>
+            <a:ext cx="367414" cy="297000"/>
+          </a:xfrm>
+          <a:prstGeom prst="rect">
+            <a:avLst/>
+          </a:prstGeom>
+        </p:spPr>
+        <p:txBody>
+          <a:bodyPr vert="horz" lIns="91440" tIns="45720" rIns="91440" bIns="45720" rtlCol="0" anchor="b"/>
+          <a:lstStyle>
+            <a:defPPr>
+              <a:defRPr lang="en-US"/>
+            </a:defPPr>
+            <a:lvl1pPr marL="0" algn="r" defTabSz="914400" rtl="0" eaLnBrk="1" latinLnBrk="0" hangingPunct="1">
+              <a:defRPr sz="1200" kern="1200">
+                <a:solidFill>
+                  <a:schemeClr val="tx1"/>
+                </a:solidFill>
+                <a:latin typeface="+mn-lt"/>
+                <a:ea typeface="+mn-ea"/>
+                <a:cs typeface="+mn-cs"/>
+              </a:defRPr>
+            </a:lvl1pPr>
+            <a:lvl2pPr marL="457200" algn="l" defTabSz="914400" rtl="0" eaLnBrk="1" latinLnBrk="0" hangingPunct="1">
+              <a:defRPr sz="1800" kern="1200">
+                <a:solidFill>
+                  <a:schemeClr val="tx1"/>
+                </a:solidFill>
+                <a:latin typeface="+mn-lt"/>
+                <a:ea typeface="+mn-ea"/>
+                <a:cs typeface="+mn-cs"/>
+              </a:defRPr>
+            </a:lvl2pPr>
+            <a:lvl3pPr marL="914400" algn="l" defTabSz="914400" rtl="0" eaLnBrk="1" latinLnBrk="0" hangingPunct="1">
+              <a:defRPr sz="1800" kern="1200">
+                <a:solidFill>
+                  <a:schemeClr val="tx1"/>
+                </a:solidFill>
+                <a:latin typeface="+mn-lt"/>
+                <a:ea typeface="+mn-ea"/>
+                <a:cs typeface="+mn-cs"/>
+              </a:defRPr>
+            </a:lvl3pPr>
+            <a:lvl4pPr marL="1371600" algn="l" defTabSz="914400" rtl="0" eaLnBrk="1" latinLnBrk="0" hangingPunct="1">
+              <a:defRPr sz="1800" kern="1200">
+                <a:solidFill>
+                  <a:schemeClr val="tx1"/>
+                </a:solidFill>
+                <a:latin typeface="+mn-lt"/>
+                <a:ea typeface="+mn-ea"/>
+                <a:cs typeface="+mn-cs"/>
+              </a:defRPr>
+            </a:lvl4pPr>
+            <a:lvl5pPr marL="1828800" algn="l" defTabSz="914400" rtl="0" eaLnBrk="1" latinLnBrk="0" hangingPunct="1">
+              <a:defRPr sz="1800" kern="1200">
+                <a:solidFill>
+                  <a:schemeClr val="tx1"/>
+                </a:solidFill>
+                <a:latin typeface="+mn-lt"/>
+                <a:ea typeface="+mn-ea"/>
+                <a:cs typeface="+mn-cs"/>
+              </a:defRPr>
+            </a:lvl5pPr>
+            <a:lvl6pPr marL="2286000" algn="l" defTabSz="914400" rtl="0" eaLnBrk="1" latinLnBrk="0" hangingPunct="1">
+              <a:defRPr sz="1800" kern="1200">
+                <a:solidFill>
+                  <a:schemeClr val="tx1"/>
+                </a:solidFill>
+                <a:latin typeface="+mn-lt"/>
+                <a:ea typeface="+mn-ea"/>
+                <a:cs typeface="+mn-cs"/>
+              </a:defRPr>
+            </a:lvl6pPr>
+            <a:lvl7pPr marL="2743200" algn="l" defTabSz="914400" rtl="0" eaLnBrk="1" latinLnBrk="0" hangingPunct="1">
+              <a:defRPr sz="1800" kern="1200">
+                <a:solidFill>
+                  <a:schemeClr val="tx1"/>
+                </a:solidFill>
+                <a:latin typeface="+mn-lt"/>
+                <a:ea typeface="+mn-ea"/>
+                <a:cs typeface="+mn-cs"/>
+              </a:defRPr>
+            </a:lvl7pPr>
+            <a:lvl8pPr marL="3200400" algn="l" defTabSz="914400" rtl="0" eaLnBrk="1" latinLnBrk="0" hangingPunct="1">
+              <a:defRPr sz="1800" kern="1200">
+                <a:solidFill>
+                  <a:schemeClr val="tx1"/>
+                </a:solidFill>
+                <a:latin typeface="+mn-lt"/>
+                <a:ea typeface="+mn-ea"/>
+                <a:cs typeface="+mn-cs"/>
+              </a:defRPr>
+            </a:lvl8pPr>
+            <a:lvl9pPr marL="3657600" algn="l" defTabSz="914400" rtl="0" eaLnBrk="1" latinLnBrk="0" hangingPunct="1">
+              <a:defRPr sz="1800" kern="1200">
+                <a:solidFill>
+                  <a:schemeClr val="tx1"/>
+                </a:solidFill>
+                <a:latin typeface="+mn-lt"/>
+                <a:ea typeface="+mn-ea"/>
+                <a:cs typeface="+mn-cs"/>
+              </a:defRPr>
+            </a:lvl9pPr>
+          </a:lstStyle>
+          <a:p>
+            <a:fld id="{3EBA5BD7-F043-4D1B-AA17-CD412FC534DE}" type="slidenum">
+              <a:rPr lang="en-US" smtClean="0"/>
+              <a:pPr/>
+              <a:t>38</a:t>
+            </a:fld>
+            <a:endParaRPr lang="en-US" dirty="0"/>
+          </a:p>
+        </p:txBody>
+      </p:sp>
+      <p:sp>
+        <p:nvSpPr>
+          <p:cNvPr id="7" name="Footer Placeholder 7">
+            <a:extLst>
+              <a:ext uri="{FF2B5EF4-FFF2-40B4-BE49-F238E27FC236}">
+                <a16:creationId xmlns:a16="http://schemas.microsoft.com/office/drawing/2014/main" id="{4E3278B1-3FC3-4FB0-AAB8-C44E4CE52A10}"/>
+              </a:ext>
+            </a:extLst>
+          </p:cNvPr>
+          <p:cNvSpPr>
+            <a:spLocks noGrp="1"/>
+          </p:cNvSpPr>
+          <p:nvPr>
+            <p:ph type="ftr" sz="quarter" idx="4"/>
+          </p:nvPr>
+        </p:nvSpPr>
+        <p:spPr>
+          <a:xfrm>
+            <a:off x="-1" y="8847000"/>
+            <a:ext cx="6488999" cy="297000"/>
+          </a:xfrm>
+          <a:prstGeom prst="rect">
+            <a:avLst/>
+          </a:prstGeom>
+        </p:spPr>
+        <p:txBody>
+          <a:bodyPr vert="horz" lIns="91440" tIns="45720" rIns="91440" bIns="45720" rtlCol="0" anchor="b"/>
+          <a:lstStyle>
+            <a:lvl1pPr algn="l">
+              <a:defRPr sz="1100"/>
+            </a:lvl1pPr>
+          </a:lstStyle>
+          <a:p>
+            <a:r>
+              <a:rPr lang="en-US" dirty="0"/>
+              <a:t>© SoftUni – </a:t>
+            </a:r>
+            <a:r>
+              <a:rPr lang="en-US" u="sng" dirty="0">
+                <a:hlinkClick r:id="rId3"/>
+              </a:rPr>
+              <a:t>https://softuni.org</a:t>
+            </a:r>
+            <a:r>
+              <a:rPr lang="en-US" dirty="0"/>
+              <a:t>. Copyrighted document. Unauthorized copy or reproduction is not permitted.</a:t>
+            </a:r>
+          </a:p>
+        </p:txBody>
+      </p:sp>
+    </p:spTree>
+    <p:extLst>
+      <p:ext uri="{BB962C8B-B14F-4D97-AF65-F5344CB8AC3E}">
+        <p14:creationId xmlns:p14="http://schemas.microsoft.com/office/powerpoint/2010/main" val="1490424457"/>
+      </p:ext>
+    </p:extLst>
+  </p:cSld>
+  <p:clrMapOvr>
+    <a:masterClrMapping/>
+  </p:clrMapOvr>
+</p:notes>
+</file>
+
 <file path=ppt/notesSlides/notesSlide2.xml><?xml version="1.0" encoding="utf-8"?>
 <p:notes xmlns:a="http://schemas.openxmlformats.org/drawingml/2006/main" xmlns:r="http://schemas.openxmlformats.org/officeDocument/2006/relationships" xmlns:p="http://schemas.openxmlformats.org/presentationml/2006/main">
   <p:cSld>
@@ -1554,7 +1795,7 @@
           <a:p>
             <a:fld id="{2BF067CD-8E6B-4360-9AA8-C5DF2A48A6D1}" type="slidenum">
               <a:rPr lang="en-US" smtClean="0"/>
-              <a:t>31</a:t>
+              <a:t>26</a:t>
             </a:fld>
             <a:endParaRPr lang="en-US" dirty="0"/>
           </a:p>
@@ -1596,7 +1837,7 @@
     </p:spTree>
     <p:extLst>
       <p:ext uri="{BB962C8B-B14F-4D97-AF65-F5344CB8AC3E}">
-        <p14:creationId xmlns:p14="http://schemas.microsoft.com/office/powerpoint/2010/main" val="2401928702"/>
+        <p14:creationId xmlns:p14="http://schemas.microsoft.com/office/powerpoint/2010/main" val="1459717994"/>
       </p:ext>
     </p:extLst>
   </p:cSld>
@@ -1650,18 +1891,18 @@
           <a:bodyPr/>
           <a:lstStyle/>
           <a:p>
-            <a:endParaRPr lang="en-US"/>
+            <a:endParaRPr lang="en-BG" dirty="0"/>
           </a:p>
         </p:txBody>
       </p:sp>
       <p:sp>
         <p:nvSpPr>
-          <p:cNvPr id="5" name="Slide Number Placeholder 4"/>
+          <p:cNvPr id="4" name="Slide Number Placeholder 3"/>
           <p:cNvSpPr>
             <a:spLocks noGrp="1"/>
           </p:cNvSpPr>
           <p:nvPr>
-            <p:ph type="sldNum" sz="quarter" idx="11"/>
+            <p:ph type="sldNum" sz="quarter" idx="5"/>
           </p:nvPr>
         </p:nvSpPr>
         <p:spPr/>
@@ -1669,10 +1910,9 @@
           <a:bodyPr/>
           <a:lstStyle/>
           <a:p>
-            <a:fld id="{3EBA5BD7-F043-4D1B-AA17-CD412FC534DE}" type="slidenum">
+            <a:fld id="{2BF067CD-8E6B-4360-9AA8-C5DF2A48A6D1}" type="slidenum">
               <a:rPr lang="en-US" smtClean="0"/>
-              <a:pPr/>
-              <a:t>36</a:t>
+              <a:t>31</a:t>
             </a:fld>
             <a:endParaRPr lang="en-US" dirty="0"/>
           </a:p>
@@ -1680,13 +1920,7 @@
       </p:sp>
       <p:sp>
         <p:nvSpPr>
-          <p:cNvPr id="7" name="Footer Placeholder 7">
-            <a:extLst>
-              <a:ext uri="{FF2B5EF4-FFF2-40B4-BE49-F238E27FC236}">
-                <a16:creationId xmlns:a16="http://schemas.microsoft.com/office/drawing/2014/main" id="{472EA18C-4C17-4B25-8D51-42217A2C277E}"/>
-              </a:ext>
-            </a:extLst>
-          </p:cNvPr>
+          <p:cNvPr id="5" name="Footer Placeholder 4"/>
           <p:cNvSpPr>
             <a:spLocks noGrp="1"/>
           </p:cNvSpPr>
@@ -1694,44 +1928,33 @@
             <p:ph type="ftr" sz="quarter" idx="4"/>
           </p:nvPr>
         </p:nvSpPr>
-        <p:spPr>
-          <a:xfrm>
-            <a:off x="-1" y="8847000"/>
-            <a:ext cx="6488999" cy="297000"/>
-          </a:xfrm>
-          <a:prstGeom prst="rect">
-            <a:avLst/>
-          </a:prstGeom>
-        </p:spPr>
+        <p:spPr/>
         <p:txBody>
-          <a:bodyPr vert="horz" lIns="91440" tIns="45720" rIns="91440" bIns="45720" rtlCol="0" anchor="b"/>
-          <a:lstStyle>
-            <a:lvl1pPr algn="l">
-              <a:defRPr sz="1100"/>
-            </a:lvl1pPr>
-          </a:lstStyle>
-          <a:p>
-            <a:r>
-              <a:rPr lang="en-US" dirty="0"/>
+          <a:bodyPr/>
+          <a:lstStyle/>
+          <a:p>
+            <a:r>
+              <a:rPr lang="en-US"/>
               <a:t>© SoftUni – </a:t>
             </a:r>
             <a:r>
-              <a:rPr lang="en-US" u="sng" dirty="0">
+              <a:rPr lang="en-US" u="sng">
                 <a:hlinkClick r:id="rId3"/>
               </a:rPr>
               <a:t>https://softuni.org</a:t>
             </a:r>
             <a:r>
-              <a:rPr lang="en-US" dirty="0"/>
+              <a:rPr lang="en-US"/>
               <a:t>. Copyrighted document. Unauthorized copy or reproduction is not permitted.</a:t>
             </a:r>
+            <a:endParaRPr lang="en-US" dirty="0"/>
           </a:p>
         </p:txBody>
       </p:sp>
     </p:spTree>
     <p:extLst>
       <p:ext uri="{BB962C8B-B14F-4D97-AF65-F5344CB8AC3E}">
-        <p14:creationId xmlns:p14="http://schemas.microsoft.com/office/powerpoint/2010/main" val="3907191427"/>
+        <p14:creationId xmlns:p14="http://schemas.microsoft.com/office/powerpoint/2010/main" val="2401928702"/>
       </p:ext>
     </p:extLst>
   </p:cSld>
@@ -1791,129 +2014,23 @@
       </p:sp>
       <p:sp>
         <p:nvSpPr>
-          <p:cNvPr id="7" name="Slide Number Placeholder 5">
-            <a:extLst>
-              <a:ext uri="{FF2B5EF4-FFF2-40B4-BE49-F238E27FC236}">
-                <a16:creationId xmlns:a16="http://schemas.microsoft.com/office/drawing/2014/main" id="{5049B984-F964-47FF-8179-0A3007CE21CD}"/>
-              </a:ext>
-            </a:extLst>
-          </p:cNvPr>
-          <p:cNvSpPr txBox="1">
-            <a:spLocks/>
+          <p:cNvPr id="5" name="Slide Number Placeholder 4"/>
+          <p:cNvSpPr>
+            <a:spLocks noGrp="1"/>
           </p:cNvSpPr>
-          <p:nvPr/>
+          <p:nvPr>
+            <p:ph type="sldNum" sz="quarter" idx="11"/>
+          </p:nvPr>
         </p:nvSpPr>
-        <p:spPr>
-          <a:xfrm>
-            <a:off x="6488999" y="8847000"/>
-            <a:ext cx="367414" cy="297000"/>
-          </a:xfrm>
-          <a:prstGeom prst="rect">
-            <a:avLst/>
-          </a:prstGeom>
-        </p:spPr>
+        <p:spPr/>
         <p:txBody>
-          <a:bodyPr vert="horz" lIns="91440" tIns="45720" rIns="91440" bIns="45720" rtlCol="0" anchor="b"/>
-          <a:lstStyle>
-            <a:defPPr>
-              <a:defRPr lang="en-US"/>
-            </a:defPPr>
-            <a:lvl1pPr marL="0" algn="r" defTabSz="914400" rtl="0" eaLnBrk="1" latinLnBrk="0" hangingPunct="1">
-              <a:defRPr sz="1200" kern="1200">
-                <a:solidFill>
-                  <a:schemeClr val="tx1"/>
-                </a:solidFill>
-                <a:latin typeface="+mn-lt"/>
-                <a:ea typeface="+mn-ea"/>
-                <a:cs typeface="+mn-cs"/>
-              </a:defRPr>
-            </a:lvl1pPr>
-            <a:lvl2pPr marL="457200" algn="l" defTabSz="914400" rtl="0" eaLnBrk="1" latinLnBrk="0" hangingPunct="1">
-              <a:defRPr sz="1800" kern="1200">
-                <a:solidFill>
-                  <a:schemeClr val="tx1"/>
-                </a:solidFill>
-                <a:latin typeface="+mn-lt"/>
-                <a:ea typeface="+mn-ea"/>
-                <a:cs typeface="+mn-cs"/>
-              </a:defRPr>
-            </a:lvl2pPr>
-            <a:lvl3pPr marL="914400" algn="l" defTabSz="914400" rtl="0" eaLnBrk="1" latinLnBrk="0" hangingPunct="1">
-              <a:defRPr sz="1800" kern="1200">
-                <a:solidFill>
-                  <a:schemeClr val="tx1"/>
-                </a:solidFill>
-                <a:latin typeface="+mn-lt"/>
-                <a:ea typeface="+mn-ea"/>
-                <a:cs typeface="+mn-cs"/>
-              </a:defRPr>
-            </a:lvl3pPr>
-            <a:lvl4pPr marL="1371600" algn="l" defTabSz="914400" rtl="0" eaLnBrk="1" latinLnBrk="0" hangingPunct="1">
-              <a:defRPr sz="1800" kern="1200">
-                <a:solidFill>
-                  <a:schemeClr val="tx1"/>
-                </a:solidFill>
-                <a:latin typeface="+mn-lt"/>
-                <a:ea typeface="+mn-ea"/>
-                <a:cs typeface="+mn-cs"/>
-              </a:defRPr>
-            </a:lvl4pPr>
-            <a:lvl5pPr marL="1828800" algn="l" defTabSz="914400" rtl="0" eaLnBrk="1" latinLnBrk="0" hangingPunct="1">
-              <a:defRPr sz="1800" kern="1200">
-                <a:solidFill>
-                  <a:schemeClr val="tx1"/>
-                </a:solidFill>
-                <a:latin typeface="+mn-lt"/>
-                <a:ea typeface="+mn-ea"/>
-                <a:cs typeface="+mn-cs"/>
-              </a:defRPr>
-            </a:lvl5pPr>
-            <a:lvl6pPr marL="2286000" algn="l" defTabSz="914400" rtl="0" eaLnBrk="1" latinLnBrk="0" hangingPunct="1">
-              <a:defRPr sz="1800" kern="1200">
-                <a:solidFill>
-                  <a:schemeClr val="tx1"/>
-                </a:solidFill>
-                <a:latin typeface="+mn-lt"/>
-                <a:ea typeface="+mn-ea"/>
-                <a:cs typeface="+mn-cs"/>
-              </a:defRPr>
-            </a:lvl6pPr>
-            <a:lvl7pPr marL="2743200" algn="l" defTabSz="914400" rtl="0" eaLnBrk="1" latinLnBrk="0" hangingPunct="1">
-              <a:defRPr sz="1800" kern="1200">
-                <a:solidFill>
-                  <a:schemeClr val="tx1"/>
-                </a:solidFill>
-                <a:latin typeface="+mn-lt"/>
-                <a:ea typeface="+mn-ea"/>
-                <a:cs typeface="+mn-cs"/>
-              </a:defRPr>
-            </a:lvl7pPr>
-            <a:lvl8pPr marL="3200400" algn="l" defTabSz="914400" rtl="0" eaLnBrk="1" latinLnBrk="0" hangingPunct="1">
-              <a:defRPr sz="1800" kern="1200">
-                <a:solidFill>
-                  <a:schemeClr val="tx1"/>
-                </a:solidFill>
-                <a:latin typeface="+mn-lt"/>
-                <a:ea typeface="+mn-ea"/>
-                <a:cs typeface="+mn-cs"/>
-              </a:defRPr>
-            </a:lvl8pPr>
-            <a:lvl9pPr marL="3657600" algn="l" defTabSz="914400" rtl="0" eaLnBrk="1" latinLnBrk="0" hangingPunct="1">
-              <a:defRPr sz="1800" kern="1200">
-                <a:solidFill>
-                  <a:schemeClr val="tx1"/>
-                </a:solidFill>
-                <a:latin typeface="+mn-lt"/>
-                <a:ea typeface="+mn-ea"/>
-                <a:cs typeface="+mn-cs"/>
-              </a:defRPr>
-            </a:lvl9pPr>
-          </a:lstStyle>
+          <a:bodyPr/>
+          <a:lstStyle/>
           <a:p>
             <a:fld id="{3EBA5BD7-F043-4D1B-AA17-CD412FC534DE}" type="slidenum">
               <a:rPr lang="en-US" smtClean="0"/>
               <a:pPr/>
-              <a:t>37</a:t>
+              <a:t>36</a:t>
             </a:fld>
             <a:endParaRPr lang="en-US" dirty="0"/>
           </a:p>
@@ -1921,10 +2038,10 @@
       </p:sp>
       <p:sp>
         <p:nvSpPr>
-          <p:cNvPr id="6" name="Footer Placeholder 7">
+          <p:cNvPr id="7" name="Footer Placeholder 7">
             <a:extLst>
               <a:ext uri="{FF2B5EF4-FFF2-40B4-BE49-F238E27FC236}">
-                <a16:creationId xmlns:a16="http://schemas.microsoft.com/office/drawing/2014/main" id="{3B25238D-30EC-49FB-9FD0-BF03E5499E5E}"/>
+                <a16:creationId xmlns:a16="http://schemas.microsoft.com/office/drawing/2014/main" id="{472EA18C-4C17-4B25-8D51-42217A2C277E}"/>
               </a:ext>
             </a:extLst>
           </p:cNvPr>
@@ -1972,7 +2089,7 @@
     </p:spTree>
     <p:extLst>
       <p:ext uri="{BB962C8B-B14F-4D97-AF65-F5344CB8AC3E}">
-        <p14:creationId xmlns:p14="http://schemas.microsoft.com/office/powerpoint/2010/main" val="3638511063"/>
+        <p14:creationId xmlns:p14="http://schemas.microsoft.com/office/powerpoint/2010/main" val="3907191427"/>
       </p:ext>
     </p:extLst>
   </p:cSld>
@@ -2032,10 +2149,10 @@
       </p:sp>
       <p:sp>
         <p:nvSpPr>
-          <p:cNvPr id="6" name="Slide Number Placeholder 5">
+          <p:cNvPr id="7" name="Slide Number Placeholder 5">
             <a:extLst>
               <a:ext uri="{FF2B5EF4-FFF2-40B4-BE49-F238E27FC236}">
-                <a16:creationId xmlns:a16="http://schemas.microsoft.com/office/drawing/2014/main" id="{6627548A-4D3C-449B-81A5-FA4BE4628490}"/>
+                <a16:creationId xmlns:a16="http://schemas.microsoft.com/office/drawing/2014/main" id="{5049B984-F964-47FF-8179-0A3007CE21CD}"/>
               </a:ext>
             </a:extLst>
           </p:cNvPr>
@@ -2154,7 +2271,7 @@
             <a:fld id="{3EBA5BD7-F043-4D1B-AA17-CD412FC534DE}" type="slidenum">
               <a:rPr lang="en-US" smtClean="0"/>
               <a:pPr/>
-              <a:t>38</a:t>
+              <a:t>37</a:t>
             </a:fld>
             <a:endParaRPr lang="en-US" dirty="0"/>
           </a:p>
@@ -2162,10 +2279,10 @@
       </p:sp>
       <p:sp>
         <p:nvSpPr>
-          <p:cNvPr id="7" name="Footer Placeholder 7">
+          <p:cNvPr id="6" name="Footer Placeholder 7">
             <a:extLst>
               <a:ext uri="{FF2B5EF4-FFF2-40B4-BE49-F238E27FC236}">
-                <a16:creationId xmlns:a16="http://schemas.microsoft.com/office/drawing/2014/main" id="{4E3278B1-3FC3-4FB0-AAB8-C44E4CE52A10}"/>
+                <a16:creationId xmlns:a16="http://schemas.microsoft.com/office/drawing/2014/main" id="{3B25238D-30EC-49FB-9FD0-BF03E5499E5E}"/>
               </a:ext>
             </a:extLst>
           </p:cNvPr>
@@ -2213,7 +2330,7 @@
     </p:spTree>
     <p:extLst>
       <p:ext uri="{BB962C8B-B14F-4D97-AF65-F5344CB8AC3E}">
-        <p14:creationId xmlns:p14="http://schemas.microsoft.com/office/powerpoint/2010/main" val="1490424457"/>
+        <p14:creationId xmlns:p14="http://schemas.microsoft.com/office/powerpoint/2010/main" val="3638511063"/>
       </p:ext>
     </p:extLst>
   </p:cSld>
@@ -17588,7 +17705,7 @@
         </p:nvSpPr>
         <p:spPr>
           <a:xfrm>
-            <a:off x="699412" y="2492028"/>
+            <a:off x="697406" y="2394000"/>
             <a:ext cx="10797188" cy="648940"/>
           </a:xfrm>
           <a:prstGeom prst="rect">
@@ -19547,7 +19664,7 @@
             </a:r>
             <a:r>
               <a:rPr lang="bg-BG" sz="3200" dirty="0"/>
-              <a:t>движение на мишката и др., или</a:t>
+              <a:t>движение на мишката и др. или</a:t>
             </a:r>
             <a:r>
               <a:rPr lang="en-US" sz="3200" dirty="0"/>
@@ -19838,7 +19955,7 @@
             </a:r>
             <a:r>
               <a:rPr lang="bg-BG" sz="3200" dirty="0"/>
-              <a:t>получателите трябва първи да </a:t>
+              <a:t>получателите трябва първо да </a:t>
             </a:r>
             <a:r>
               <a:rPr lang="en-US" sz="3200" dirty="0"/>
@@ -22517,7 +22634,7 @@
                   <a:schemeClr val="bg1"/>
                 </a:solidFill>
               </a:rPr>
-              <a:t>връща </a:t>
+              <a:t>не връща стойност </a:t>
             </a:r>
             <a:r>
               <a:rPr lang="en-US" b="1" dirty="0">
@@ -22525,7 +22642,7 @@
                   <a:schemeClr val="bg1"/>
                 </a:solidFill>
               </a:rPr>
-              <a:t>void</a:t>
+              <a:t>(void)</a:t>
             </a:r>
           </a:p>
           <a:p>
@@ -25143,7 +25260,7 @@
             </a:r>
             <a:r>
               <a:rPr lang="bg-BG" dirty="0"/>
-              <a:t>Пример</a:t>
+              <a:t>пример</a:t>
             </a:r>
             <a:endParaRPr lang="en-US" dirty="0"/>
           </a:p>
@@ -27421,7 +27538,7 @@
             </a:r>
             <a:r>
               <a:rPr lang="bg-BG" dirty="0"/>
-              <a:t> което пише цвета на конзолата при </a:t>
+              <a:t> което променя цвета на конзолата при </a:t>
             </a:r>
             <a:r>
               <a:rPr lang="bg-BG" b="1" dirty="0">
@@ -28387,7 +28504,7 @@
         </p:nvSpPr>
         <p:spPr>
           <a:xfrm>
-            <a:off x="6861001" y="6093296"/>
+            <a:off x="6886766" y="6104044"/>
             <a:ext cx="4136954" cy="495108"/>
           </a:xfrm>
           <a:prstGeom prst="rect">
@@ -33218,7 +33335,7 @@
             </a:pPr>
             <a:r>
               <a:rPr lang="bg-BG" sz="3200" dirty="0"/>
-              <a:t>Може да се използват, за да се дефинират </a:t>
+              <a:t>Може да се използва, за да се дефинират </a:t>
             </a:r>
             <a:r>
               <a:rPr lang="en-US" sz="3200" dirty="0"/>
@@ -33766,7 +33883,7 @@
         </p:nvSpPr>
         <p:spPr>
           <a:xfrm>
-            <a:off x="191940" y="1275795"/>
+            <a:off x="188491" y="1229924"/>
             <a:ext cx="11815018" cy="5527326"/>
           </a:xfrm>
         </p:spPr>
@@ -33782,10 +33899,10 @@
               </a:lnSpc>
             </a:pPr>
             <a:r>
-              <a:rPr lang="bg-BG" sz="3000" dirty="0"/>
-              <a:t>Инициализация на функция</a:t>
-            </a:r>
-            <a:endParaRPr lang="en-US" sz="3000" dirty="0"/>
+              <a:rPr lang="bg-BG" sz="2900" dirty="0"/>
+              <a:t>Инициализация на функцията:</a:t>
+            </a:r>
+            <a:endParaRPr lang="en-US" sz="2900" dirty="0"/>
           </a:p>
           <a:p>
             <a:pPr>
@@ -33793,7 +33910,7 @@
                 <a:spcPct val="100000"/>
               </a:lnSpc>
             </a:pPr>
-            <a:endParaRPr lang="en-US" sz="3000" dirty="0"/>
+            <a:endParaRPr lang="en-US" sz="2900" dirty="0"/>
           </a:p>
           <a:p>
             <a:pPr>
@@ -33801,7 +33918,7 @@
                 <a:spcPct val="100000"/>
               </a:lnSpc>
             </a:pPr>
-            <a:endParaRPr lang="en-US" sz="3000" dirty="0"/>
+            <a:endParaRPr lang="en-US" sz="2900" dirty="0"/>
           </a:p>
           <a:p>
             <a:pPr>
@@ -33809,7 +33926,7 @@
                 <a:spcPct val="100000"/>
               </a:lnSpc>
             </a:pPr>
-            <a:endParaRPr lang="bg-BG" sz="3000" dirty="0"/>
+            <a:endParaRPr lang="bg-BG" sz="2900" dirty="0"/>
           </a:p>
           <a:p>
             <a:pPr>
@@ -33817,7 +33934,7 @@
                 <a:spcPct val="100000"/>
               </a:lnSpc>
             </a:pPr>
-            <a:endParaRPr lang="en-US" sz="3000" dirty="0"/>
+            <a:endParaRPr lang="en-US" sz="2900" dirty="0"/>
           </a:p>
           <a:p>
             <a:pPr>
@@ -33826,18 +33943,18 @@
               </a:lnSpc>
             </a:pPr>
             <a:r>
-              <a:rPr lang="bg-BG" sz="3000" dirty="0"/>
+              <a:rPr lang="bg-BG" sz="2900" dirty="0"/>
               <a:t>Типът на входа и на изхода може да бъде </a:t>
             </a:r>
             <a:r>
-              <a:rPr lang="bg-BG" sz="3000" b="1" dirty="0">
+              <a:rPr lang="bg-BG" sz="2900" b="1" dirty="0">
                 <a:solidFill>
                   <a:schemeClr val="bg1"/>
                 </a:solidFill>
               </a:rPr>
               <a:t>различен</a:t>
             </a:r>
-            <a:endParaRPr lang="en-US" sz="3000" b="1" dirty="0">
+            <a:endParaRPr lang="en-US" sz="2900" b="1" dirty="0">
               <a:solidFill>
                 <a:schemeClr val="bg1"/>
               </a:solidFill>
@@ -33850,18 +33967,18 @@
               </a:lnSpc>
             </a:pPr>
             <a:r>
-              <a:rPr lang="bg-BG" sz="3000" dirty="0"/>
+              <a:rPr lang="bg-BG" sz="2900" dirty="0"/>
               <a:t>Типът на входа и на изхода </a:t>
             </a:r>
             <a:r>
-              <a:rPr lang="bg-BG" sz="3000" b="1" dirty="0">
+              <a:rPr lang="bg-BG" sz="2900" b="1" dirty="0">
                 <a:solidFill>
                   <a:schemeClr val="bg1"/>
                 </a:solidFill>
               </a:rPr>
-              <a:t>трябва да същия като декларирания тип</a:t>
-            </a:r>
-            <a:endParaRPr lang="en-US" sz="3000" b="1" dirty="0">
+              <a:t>трябва да бъде същият като декларирания тип</a:t>
+            </a:r>
+            <a:endParaRPr lang="en-US" sz="2900" b="1" dirty="0">
               <a:solidFill>
                 <a:schemeClr val="bg1"/>
               </a:solidFill>
@@ -33877,19 +33994,19 @@
               </a:buClr>
             </a:pPr>
             <a:r>
-              <a:rPr lang="en-US" sz="3000" dirty="0"/>
+              <a:rPr lang="en-US" sz="2900" dirty="0"/>
               <a:t>Generic </a:t>
             </a:r>
             <a:r>
-              <a:rPr lang="bg-BG" sz="3000" dirty="0"/>
-              <a:t>делегата</a:t>
-            </a:r>
-            <a:r>
-              <a:rPr lang="en-US" sz="3000" dirty="0"/>
+              <a:rPr lang="bg-BG" sz="2900" dirty="0"/>
+              <a:t>делегатът</a:t>
+            </a:r>
+            <a:r>
+              <a:rPr lang="en-US" sz="2900" dirty="0"/>
               <a:t> </a:t>
             </a:r>
             <a:r>
-              <a:rPr lang="en-US" sz="3000" b="1" noProof="1">
+              <a:rPr lang="en-US" sz="2900" b="1" noProof="1">
                 <a:solidFill>
                   <a:schemeClr val="bg1"/>
                 </a:solidFill>
@@ -33898,22 +34015,22 @@
               <a:t>Func</a:t>
             </a:r>
             <a:r>
-              <a:rPr lang="en-US" sz="3000" dirty="0"/>
+              <a:rPr lang="en-US" sz="2900" dirty="0"/>
               <a:t> </a:t>
             </a:r>
             <a:r>
-              <a:rPr lang="bg-BG" sz="3000" dirty="0"/>
+              <a:rPr lang="bg-BG" sz="2900" dirty="0"/>
               <a:t>дефинира</a:t>
             </a:r>
             <a:r>
-              <a:rPr lang="en-US" sz="3000" dirty="0"/>
+              <a:rPr lang="en-US" sz="2900" dirty="0"/>
               <a:t> </a:t>
             </a:r>
             <a:r>
-              <a:rPr lang="bg-BG" sz="3000" dirty="0"/>
+              <a:rPr lang="bg-BG" sz="2900" dirty="0"/>
               <a:t>броя и типа на входните параметри и връща типа на делегата</a:t>
             </a:r>
-            <a:endParaRPr lang="en-US" sz="3000" dirty="0"/>
+            <a:endParaRPr lang="en-US" sz="2900" dirty="0"/>
           </a:p>
         </p:txBody>
       </p:sp>
@@ -34054,8 +34171,8 @@
           </a:xfrm>
           <a:prstGeom prst="wedgeRoundRectCallout">
             <a:avLst>
-              <a:gd name="adj1" fmla="val 72109"/>
-              <a:gd name="adj2" fmla="val 70075"/>
+              <a:gd name="adj1" fmla="val 66962"/>
+              <a:gd name="adj2" fmla="val 97958"/>
               <a:gd name="adj3" fmla="val 16667"/>
             </a:avLst>
           </a:prstGeom>
@@ -34252,8 +34369,8 @@
           </a:xfrm>
           <a:prstGeom prst="wedgeRoundRectCallout">
             <a:avLst>
-              <a:gd name="adj1" fmla="val -10930"/>
-              <a:gd name="adj2" fmla="val -85039"/>
+              <a:gd name="adj1" fmla="val -4123"/>
+              <a:gd name="adj2" fmla="val -82279"/>
               <a:gd name="adj3" fmla="val 16667"/>
             </a:avLst>
           </a:prstGeom>

</xml_diff>

<commit_message>
Updated metadata for "14. Delegates and Events"
</commit_message>
<xml_diff>
--- a/Courses/Software-Sciences/Module-1-OOP-New/14-Delegates-and-Events/14-Delegates-and-Events.pptx
+++ b/Courses/Software-Sciences/Module-1-OOP-New/14-Delegates-and-Events/14-Delegates-and-Events.pptx
@@ -325,7 +325,7 @@
           <a:p>
             <a:fld id="{4E087215-0C8F-4762-A664-737A353EC9A4}" type="datetimeFigureOut">
               <a:rPr lang="bg-BG" smtClean="0"/>
-              <a:t>13.1.2023 г.</a:t>
+              <a:t>18.01.23 г.</a:t>
             </a:fld>
             <a:endParaRPr lang="bg-BG"/>
           </a:p>
@@ -516,7 +516,7 @@
           <a:p>
             <a:fld id="{72D84649-876A-46C9-8472-14CB09C070D8}" type="datetimeFigureOut">
               <a:rPr lang="en-US" smtClean="0"/>
-              <a:t>13-Jan-23</a:t>
+              <a:t>1/18/23</a:t>
             </a:fld>
             <a:endParaRPr lang="en-US"/>
           </a:p>

</xml_diff>